<commit_message>
presentation and explanatory note added
</commit_message>
<xml_diff>
--- a/defence_of_project/presentation.pptx
+++ b/defence_of_project/presentation.pptx
@@ -3750,31 +3750,7 @@
                   <a:schemeClr val="tx1"/>
                 </a:solidFill>
               </a:rPr>
-              <a:t>Спасибо за внимание. </a:t>
-            </a:r>
-            <a:r>
-              <a:rPr lang="ru-RU" sz="2800" dirty="0" smtClean="0">
-                <a:solidFill>
-                  <a:schemeClr val="tx1"/>
-                </a:solidFill>
-              </a:rPr>
-              <a:t>Мы </a:t>
-            </a:r>
-            <a:r>
-              <a:rPr lang="ru-RU" sz="2800" dirty="0" smtClean="0">
-                <a:solidFill>
-                  <a:schemeClr val="tx1"/>
-                </a:solidFill>
-              </a:rPr>
-              <a:t>готовы </a:t>
-            </a:r>
-            <a:r>
-              <a:rPr lang="ru-RU" sz="2800" dirty="0" smtClean="0">
-                <a:solidFill>
-                  <a:schemeClr val="tx1"/>
-                </a:solidFill>
-              </a:rPr>
-              <a:t>ответить на Ваши вопросы</a:t>
+              <a:t>Спасибо за внимание. Мы готовы ответить на Ваши вопросы</a:t>
             </a:r>
             <a:endParaRPr lang="ru-RU" sz="2800" dirty="0">
               <a:solidFill>
@@ -4196,15 +4172,7 @@
                   <a:schemeClr val="tx1"/>
                 </a:solidFill>
               </a:rPr>
-              <a:t>: </a:t>
-            </a:r>
-            <a:r>
-              <a:rPr lang="ru-RU" i="1" dirty="0" smtClean="0">
-                <a:solidFill>
-                  <a:schemeClr val="tx1"/>
-                </a:solidFill>
-              </a:rPr>
-              <a:t>Новиков Владимир, </a:t>
+              <a:t>: Новиков Владимир, </a:t>
             </a:r>
             <a:r>
               <a:rPr lang="ru-RU" dirty="0" err="1">
@@ -4246,11 +4214,6 @@
               </a:rPr>
               <a:t>     </a:t>
             </a:r>
-            <a:endParaRPr lang="ru-RU" i="1" dirty="0" smtClean="0">
-              <a:solidFill>
-                <a:schemeClr val="tx1"/>
-              </a:solidFill>
-            </a:endParaRPr>
           </a:p>
           <a:p>
             <a:pPr algn="l"/>
@@ -4287,15 +4250,7 @@
                   <a:schemeClr val="tx1"/>
                 </a:solidFill>
               </a:rPr>
-              <a:t>: </a:t>
-            </a:r>
-            <a:r>
-              <a:rPr lang="ru-RU" i="1" dirty="0" smtClean="0">
-                <a:solidFill>
-                  <a:schemeClr val="tx1"/>
-                </a:solidFill>
-              </a:rPr>
-              <a:t>9 января 2023 </a:t>
+              <a:t>: 9 января 2023 </a:t>
             </a:r>
             <a:r>
               <a:rPr lang="ru-RU" dirty="0" smtClean="0">
@@ -4793,13 +4748,8 @@
           <a:p>
             <a:r>
               <a:rPr lang="ru-RU" dirty="0" smtClean="0"/>
-              <a:t>Написать программу для </a:t>
-            </a:r>
-            <a:r>
-              <a:rPr lang="ru-RU" dirty="0" smtClean="0"/>
-              <a:t>игры в Тетрис</a:t>
-            </a:r>
-            <a:endParaRPr lang="ru-RU" dirty="0" smtClean="0"/>
+              <a:t>Написать программу для игры в Тетрис</a:t>
+            </a:r>
           </a:p>
         </p:txBody>
       </p:sp>
@@ -5054,14 +5004,12 @@
               <a:rPr lang="ru-RU" dirty="0" smtClean="0"/>
               <a:t>Дети</a:t>
             </a:r>
-            <a:endParaRPr lang="ru-RU" dirty="0" smtClean="0"/>
           </a:p>
           <a:p>
             <a:r>
               <a:rPr lang="ru-RU" dirty="0" smtClean="0"/>
               <a:t>Взрослые</a:t>
             </a:r>
-            <a:endParaRPr lang="ru-RU" dirty="0" smtClean="0"/>
           </a:p>
         </p:txBody>
       </p:sp>
@@ -5371,7 +5319,15 @@
           <a:p>
             <a:r>
               <a:rPr lang="ru-RU" i="1" dirty="0" smtClean="0"/>
-              <a:t>Создание системы хранения результатов и статистики</a:t>
+              <a:t>Создание </a:t>
+            </a:r>
+            <a:r>
+              <a:rPr lang="ru-RU" i="1" dirty="0" smtClean="0"/>
+              <a:t>подсистемы </a:t>
+            </a:r>
+            <a:r>
+              <a:rPr lang="ru-RU" i="1" dirty="0" smtClean="0"/>
+              <a:t>хранения результатов и статистики</a:t>
             </a:r>
             <a:endParaRPr lang="ru-RU" i="1" dirty="0"/>
           </a:p>
@@ -5390,8 +5346,13 @@
           <a:p>
             <a:r>
               <a:rPr lang="ru-RU" i="1" dirty="0"/>
-              <a:t>Создание анимацией надписей</a:t>
-            </a:r>
+              <a:t>Создание </a:t>
+            </a:r>
+            <a:r>
+              <a:rPr lang="ru-RU" i="1" dirty="0" err="1" smtClean="0"/>
+              <a:t>анимаций</a:t>
+            </a:r>
+            <a:endParaRPr lang="ru-RU" i="1" dirty="0"/>
           </a:p>
           <a:p>
             <a:endParaRPr lang="ru-RU" i="1" dirty="0"/>
@@ -5526,11 +5487,7 @@
           <a:p>
             <a:r>
               <a:rPr lang="ru-RU" dirty="0" smtClean="0"/>
-              <a:t>Начальный </a:t>
-            </a:r>
-            <a:r>
-              <a:rPr lang="ru-RU" dirty="0" smtClean="0"/>
-              <a:t>экран</a:t>
+              <a:t>Начальный экран</a:t>
             </a:r>
           </a:p>
           <a:p>
@@ -5542,38 +5499,23 @@
               <a:rPr lang="ru-RU" dirty="0" smtClean="0"/>
               <a:t>статистикой</a:t>
             </a:r>
-            <a:endParaRPr lang="ru-RU" dirty="0" smtClean="0"/>
           </a:p>
           <a:p>
             <a:r>
               <a:rPr lang="ru-RU" dirty="0" smtClean="0"/>
-              <a:t>Диалоговое окно </a:t>
-            </a:r>
-            <a:r>
-              <a:rPr lang="ru-RU" dirty="0" smtClean="0"/>
-              <a:t>для </a:t>
-            </a:r>
-            <a:r>
-              <a:rPr lang="ru-RU" dirty="0" smtClean="0"/>
-              <a:t>ввода имени</a:t>
-            </a:r>
-            <a:endParaRPr lang="ru-RU" dirty="0" smtClean="0"/>
+              <a:t>Диалоговое окно для ввода имени</a:t>
+            </a:r>
           </a:p>
           <a:p>
             <a:r>
               <a:rPr lang="ru-RU" dirty="0" smtClean="0"/>
               <a:t>Игровое поле</a:t>
             </a:r>
-            <a:endParaRPr lang="ru-RU" dirty="0" smtClean="0"/>
           </a:p>
           <a:p>
             <a:r>
               <a:rPr lang="ru-RU" dirty="0" smtClean="0"/>
-              <a:t>Экран с </a:t>
-            </a:r>
-            <a:r>
-              <a:rPr lang="ru-RU" dirty="0" smtClean="0"/>
-              <a:t>результатами</a:t>
+              <a:t>Экран с результатами</a:t>
             </a:r>
             <a:endParaRPr lang="ru-RU" dirty="0"/>
           </a:p>
@@ -5752,7 +5694,7 @@
         </p:blipFill>
         <p:spPr bwMode="auto">
           <a:xfrm>
-            <a:off x="1326637" y="1557472"/>
+            <a:off x="204482" y="1588671"/>
             <a:ext cx="2035786" cy="2035786"/>
           </a:xfrm>
           <a:prstGeom prst="rect">
@@ -5778,7 +5720,7 @@
         </p:nvSpPr>
         <p:spPr>
           <a:xfrm>
-            <a:off x="1326637" y="3227196"/>
+            <a:off x="204482" y="3209870"/>
             <a:ext cx="2336800" cy="923330"/>
           </a:xfrm>
           <a:prstGeom prst="rect">
@@ -5915,7 +5857,7 @@
           <p:cNvPr id="7" name="Рисунок 6">
             <a:extLst>
               <a:ext uri="{FF2B5EF4-FFF2-40B4-BE49-F238E27FC236}">
-                <a16:creationId xmlns:lc="http://schemas.openxmlformats.org/drawingml/2006/lockedCanvas" xmlns:a16="http://schemas.microsoft.com/office/drawing/2014/main" xmlns="" id="{404390DE-A7B3-4FEB-8EF6-5B3D5002D9C5}"/>
+                <a16:creationId xmlns="" xmlns:a16="http://schemas.microsoft.com/office/drawing/2014/main" xmlns:lc="http://schemas.openxmlformats.org/drawingml/2006/lockedCanvas" id="{404390DE-A7B3-4FEB-8EF6-5B3D5002D9C5}"/>
               </a:ext>
             </a:extLst>
           </p:cNvPr>
@@ -5938,7 +5880,7 @@
         </p:blipFill>
         <p:spPr>
           <a:xfrm>
-            <a:off x="2270465" y="4150526"/>
+            <a:off x="5160329" y="4145015"/>
             <a:ext cx="5705078" cy="2139403"/>
           </a:xfrm>
           <a:prstGeom prst="rect">
@@ -5969,7 +5911,7 @@
         </p:blipFill>
         <p:spPr bwMode="auto">
           <a:xfrm>
-            <a:off x="3362423" y="1470417"/>
+            <a:off x="2136775" y="1489378"/>
             <a:ext cx="2920061" cy="1625077"/>
           </a:xfrm>
           <a:prstGeom prst="rect">
@@ -5995,7 +5937,7 @@
         </p:nvSpPr>
         <p:spPr>
           <a:xfrm>
-            <a:off x="3701560" y="3202116"/>
+            <a:off x="2579405" y="3184790"/>
             <a:ext cx="2336800" cy="923330"/>
           </a:xfrm>
           <a:prstGeom prst="rect">
@@ -6228,7 +6170,7 @@
         </p:blipFill>
         <p:spPr bwMode="auto">
           <a:xfrm>
-            <a:off x="6038360" y="1540146"/>
+            <a:off x="4916205" y="1522820"/>
             <a:ext cx="1608182" cy="1608182"/>
           </a:xfrm>
           <a:prstGeom prst="rect">
@@ -6269,7 +6211,7 @@
         </p:blipFill>
         <p:spPr bwMode="auto">
           <a:xfrm>
-            <a:off x="6120876" y="4042281"/>
+            <a:off x="6803360" y="1531938"/>
             <a:ext cx="1691763" cy="1763663"/>
           </a:xfrm>
           <a:prstGeom prst="rect">
@@ -6295,7 +6237,7 @@
         </p:nvSpPr>
         <p:spPr>
           <a:xfrm>
-            <a:off x="6382558" y="3239011"/>
+            <a:off x="5260403" y="3221685"/>
             <a:ext cx="1168400" cy="923330"/>
           </a:xfrm>
           <a:prstGeom prst="rect">
@@ -6435,7 +6377,7 @@
         </p:nvSpPr>
         <p:spPr>
           <a:xfrm>
-            <a:off x="6120876" y="5828264"/>
+            <a:off x="6803360" y="3317921"/>
             <a:ext cx="1928698" cy="923330"/>
           </a:xfrm>
           <a:prstGeom prst="rect">
@@ -6590,7 +6532,7 @@
         </p:blipFill>
         <p:spPr bwMode="auto">
           <a:xfrm>
-            <a:off x="1098012" y="4437792"/>
+            <a:off x="4138716" y="4423151"/>
             <a:ext cx="3163160" cy="1499865"/>
           </a:xfrm>
           <a:prstGeom prst="rect">
@@ -7006,7 +6948,7 @@
         </p:nvSpPr>
         <p:spPr>
           <a:xfrm>
-            <a:off x="1326637" y="5805944"/>
+            <a:off x="4551896" y="5791303"/>
             <a:ext cx="2336800" cy="923330"/>
           </a:xfrm>
           <a:prstGeom prst="rect">
@@ -7146,8 +7088,8 @@
         </p:nvSpPr>
         <p:spPr>
           <a:xfrm>
-            <a:off x="4629958" y="5828264"/>
-            <a:ext cx="2336800" cy="923330"/>
+            <a:off x="7649241" y="5791303"/>
+            <a:ext cx="1075849" cy="923330"/>
           </a:xfrm>
           <a:prstGeom prst="rect">
             <a:avLst/>
@@ -7265,6 +7207,187 @@
                 <a:cs typeface="Times New Roman" panose="02020603050405020304" pitchFamily="18" charset="0"/>
               </a:rPr>
               <a:t>git</a:t>
+            </a:r>
+            <a:endParaRPr lang="ru-RU" sz="5400" dirty="0">
+              <a:solidFill>
+                <a:schemeClr val="bg2">
+                  <a:lumMod val="10000"/>
+                </a:schemeClr>
+              </a:solidFill>
+              <a:latin typeface="Times New Roman" panose="02020603050405020304" pitchFamily="18" charset="0"/>
+              <a:cs typeface="Times New Roman" panose="02020603050405020304" pitchFamily="18" charset="0"/>
+            </a:endParaRPr>
+          </a:p>
+        </p:txBody>
+      </p:sp>
+      <p:pic>
+        <p:nvPicPr>
+          <p:cNvPr id="1026" name="Picture 2" descr="File:Pygame logo.svg - Wikimedia Commons"/>
+          <p:cNvPicPr>
+            <a:picLocks noChangeAspect="1" noChangeArrowheads="1"/>
+          </p:cNvPicPr>
+          <p:nvPr/>
+        </p:nvPicPr>
+        <p:blipFill>
+          <a:blip r:embed="rId9" cstate="print">
+            <a:extLst>
+              <a:ext uri="{28A0092B-C50C-407E-A947-70E740481C1C}">
+                <a14:useLocalDpi xmlns:a14="http://schemas.microsoft.com/office/drawing/2010/main" val="0"/>
+              </a:ext>
+            </a:extLst>
+          </a:blip>
+          <a:srcRect/>
+          <a:stretch>
+            <a:fillRect/>
+          </a:stretch>
+        </p:blipFill>
+        <p:spPr bwMode="auto">
+          <a:xfrm>
+            <a:off x="228012" y="4423151"/>
+            <a:ext cx="3910704" cy="1096830"/>
+          </a:xfrm>
+          <a:prstGeom prst="rect">
+            <a:avLst/>
+          </a:prstGeom>
+          <a:noFill/>
+          <a:extLst>
+            <a:ext uri="{909E8E84-426E-40DD-AFC4-6F175D3DCCD1}">
+              <a14:hiddenFill xmlns:a14="http://schemas.microsoft.com/office/drawing/2010/main">
+                <a:solidFill>
+                  <a:srgbClr val="FFFFFF"/>
+                </a:solidFill>
+              </a14:hiddenFill>
+            </a:ext>
+          </a:extLst>
+        </p:spPr>
+      </p:pic>
+      <p:sp>
+        <p:nvSpPr>
+          <p:cNvPr id="29" name="TextBox 3"/>
+          <p:cNvSpPr txBox="1"/>
+          <p:nvPr/>
+        </p:nvSpPr>
+        <p:spPr>
+          <a:xfrm>
+            <a:off x="765175" y="5791303"/>
+            <a:ext cx="2586589" cy="923330"/>
+          </a:xfrm>
+          <a:prstGeom prst="rect">
+            <a:avLst/>
+          </a:prstGeom>
+          <a:noFill/>
+        </p:spPr>
+        <p:txBody>
+          <a:bodyPr wrap="square" rtlCol="0">
+            <a:spAutoFit/>
+          </a:bodyPr>
+          <a:lstStyle>
+            <a:defPPr>
+              <a:defRPr lang="ru-RU"/>
+            </a:defPPr>
+            <a:lvl1pPr marL="0" algn="l" defTabSz="914400" rtl="0" eaLnBrk="1" latinLnBrk="0" hangingPunct="1">
+              <a:defRPr sz="1800" kern="1200">
+                <a:solidFill>
+                  <a:schemeClr val="tx1"/>
+                </a:solidFill>
+                <a:latin typeface="+mn-lt"/>
+                <a:ea typeface="+mn-ea"/>
+                <a:cs typeface="+mn-cs"/>
+              </a:defRPr>
+            </a:lvl1pPr>
+            <a:lvl2pPr marL="457200" algn="l" defTabSz="914400" rtl="0" eaLnBrk="1" latinLnBrk="0" hangingPunct="1">
+              <a:defRPr sz="1800" kern="1200">
+                <a:solidFill>
+                  <a:schemeClr val="tx1"/>
+                </a:solidFill>
+                <a:latin typeface="+mn-lt"/>
+                <a:ea typeface="+mn-ea"/>
+                <a:cs typeface="+mn-cs"/>
+              </a:defRPr>
+            </a:lvl2pPr>
+            <a:lvl3pPr marL="914400" algn="l" defTabSz="914400" rtl="0" eaLnBrk="1" latinLnBrk="0" hangingPunct="1">
+              <a:defRPr sz="1800" kern="1200">
+                <a:solidFill>
+                  <a:schemeClr val="tx1"/>
+                </a:solidFill>
+                <a:latin typeface="+mn-lt"/>
+                <a:ea typeface="+mn-ea"/>
+                <a:cs typeface="+mn-cs"/>
+              </a:defRPr>
+            </a:lvl3pPr>
+            <a:lvl4pPr marL="1371600" algn="l" defTabSz="914400" rtl="0" eaLnBrk="1" latinLnBrk="0" hangingPunct="1">
+              <a:defRPr sz="1800" kern="1200">
+                <a:solidFill>
+                  <a:schemeClr val="tx1"/>
+                </a:solidFill>
+                <a:latin typeface="+mn-lt"/>
+                <a:ea typeface="+mn-ea"/>
+                <a:cs typeface="+mn-cs"/>
+              </a:defRPr>
+            </a:lvl4pPr>
+            <a:lvl5pPr marL="1828800" algn="l" defTabSz="914400" rtl="0" eaLnBrk="1" latinLnBrk="0" hangingPunct="1">
+              <a:defRPr sz="1800" kern="1200">
+                <a:solidFill>
+                  <a:schemeClr val="tx1"/>
+                </a:solidFill>
+                <a:latin typeface="+mn-lt"/>
+                <a:ea typeface="+mn-ea"/>
+                <a:cs typeface="+mn-cs"/>
+              </a:defRPr>
+            </a:lvl5pPr>
+            <a:lvl6pPr marL="2286000" algn="l" defTabSz="914400" rtl="0" eaLnBrk="1" latinLnBrk="0" hangingPunct="1">
+              <a:defRPr sz="1800" kern="1200">
+                <a:solidFill>
+                  <a:schemeClr val="tx1"/>
+                </a:solidFill>
+                <a:latin typeface="+mn-lt"/>
+                <a:ea typeface="+mn-ea"/>
+                <a:cs typeface="+mn-cs"/>
+              </a:defRPr>
+            </a:lvl6pPr>
+            <a:lvl7pPr marL="2743200" algn="l" defTabSz="914400" rtl="0" eaLnBrk="1" latinLnBrk="0" hangingPunct="1">
+              <a:defRPr sz="1800" kern="1200">
+                <a:solidFill>
+                  <a:schemeClr val="tx1"/>
+                </a:solidFill>
+                <a:latin typeface="+mn-lt"/>
+                <a:ea typeface="+mn-ea"/>
+                <a:cs typeface="+mn-cs"/>
+              </a:defRPr>
+            </a:lvl7pPr>
+            <a:lvl8pPr marL="3200400" algn="l" defTabSz="914400" rtl="0" eaLnBrk="1" latinLnBrk="0" hangingPunct="1">
+              <a:defRPr sz="1800" kern="1200">
+                <a:solidFill>
+                  <a:schemeClr val="tx1"/>
+                </a:solidFill>
+                <a:latin typeface="+mn-lt"/>
+                <a:ea typeface="+mn-ea"/>
+                <a:cs typeface="+mn-cs"/>
+              </a:defRPr>
+            </a:lvl8pPr>
+            <a:lvl9pPr marL="3657600" algn="l" defTabSz="914400" rtl="0" eaLnBrk="1" latinLnBrk="0" hangingPunct="1">
+              <a:defRPr sz="1800" kern="1200">
+                <a:solidFill>
+                  <a:schemeClr val="tx1"/>
+                </a:solidFill>
+                <a:latin typeface="+mn-lt"/>
+                <a:ea typeface="+mn-ea"/>
+                <a:cs typeface="+mn-cs"/>
+              </a:defRPr>
+            </a:lvl9pPr>
+          </a:lstStyle>
+          <a:p>
+            <a:r>
+              <a:rPr lang="en-US" sz="5400" dirty="0" err="1" smtClean="0">
+                <a:solidFill>
+                  <a:schemeClr val="bg2">
+                    <a:lumMod val="10000"/>
+                  </a:schemeClr>
+                </a:solidFill>
+                <a:latin typeface="Times New Roman" panose="02020603050405020304" pitchFamily="18" charset="0"/>
+                <a:cs typeface="Times New Roman" panose="02020603050405020304" pitchFamily="18" charset="0"/>
+              </a:rPr>
+              <a:t>pygame</a:t>
             </a:r>
             <a:endParaRPr lang="ru-RU" sz="5400" dirty="0">
               <a:solidFill>
@@ -7370,11 +7493,7 @@
           <a:p>
             <a:r>
               <a:rPr lang="ru-RU" sz="2800" dirty="0" smtClean="0"/>
-              <a:t>Объём программного </a:t>
-            </a:r>
-            <a:r>
-              <a:rPr lang="ru-RU" sz="2800" dirty="0" smtClean="0"/>
-              <a:t>кода –  </a:t>
+              <a:t>Объём программного кода –  </a:t>
             </a:r>
             <a:r>
               <a:rPr lang="en-US" sz="2800" dirty="0" smtClean="0"/>
@@ -7384,7 +7503,6 @@
               <a:rPr lang="ru-RU" sz="2800" dirty="0" smtClean="0"/>
               <a:t>строк</a:t>
             </a:r>
-            <a:endParaRPr lang="ru-RU" sz="2800" dirty="0" smtClean="0"/>
           </a:p>
           <a:p>
             <a:r>
@@ -7413,11 +7531,7 @@
           <a:p>
             <a:r>
               <a:rPr lang="ru-RU" sz="2800" dirty="0" smtClean="0"/>
-              <a:t>Сроки </a:t>
-            </a:r>
-            <a:r>
-              <a:rPr lang="ru-RU" sz="2800" dirty="0" smtClean="0"/>
-              <a:t>соблюдены</a:t>
+              <a:t>Сроки соблюдены</a:t>
             </a:r>
           </a:p>
           <a:p>
@@ -7599,11 +7713,7 @@
             </a:r>
             <a:r>
               <a:rPr lang="ru-RU" sz="2800" b="1" u="sng" dirty="0" smtClean="0"/>
-              <a:t>(реализовано</a:t>
-            </a:r>
-            <a:r>
-              <a:rPr lang="ru-RU" sz="2800" b="1" u="sng" dirty="0" smtClean="0"/>
-              <a:t>)</a:t>
+              <a:t>(реализовано)</a:t>
             </a:r>
             <a:endParaRPr lang="ru-RU" sz="2800" dirty="0" smtClean="0"/>
           </a:p>
@@ -7622,11 +7732,7 @@
             </a:r>
             <a:r>
               <a:rPr lang="ru-RU" sz="2800" b="1" u="sng" dirty="0" smtClean="0"/>
-              <a:t>(реализовано</a:t>
-            </a:r>
-            <a:r>
-              <a:rPr lang="ru-RU" sz="2800" b="1" u="sng" dirty="0" smtClean="0"/>
-              <a:t>)</a:t>
+              <a:t>(реализовано)</a:t>
             </a:r>
             <a:endParaRPr lang="ru-RU" sz="2800" dirty="0" smtClean="0"/>
           </a:p>
@@ -7645,11 +7751,7 @@
             </a:r>
             <a:r>
               <a:rPr lang="ru-RU" sz="2800" b="1" u="sng" dirty="0" smtClean="0"/>
-              <a:t>(реализовано</a:t>
-            </a:r>
-            <a:r>
-              <a:rPr lang="ru-RU" sz="2800" b="1" u="sng" dirty="0" smtClean="0"/>
-              <a:t>)</a:t>
+              <a:t>(реализовано)</a:t>
             </a:r>
             <a:endParaRPr lang="ru-RU" sz="2800" dirty="0" smtClean="0"/>
           </a:p>
@@ -7664,11 +7766,7 @@
             </a:r>
             <a:r>
               <a:rPr lang="ru-RU" sz="2800" b="1" u="sng" dirty="0" smtClean="0"/>
-              <a:t>(реализовано</a:t>
-            </a:r>
-            <a:r>
-              <a:rPr lang="ru-RU" sz="2800" b="1" u="sng" dirty="0" smtClean="0"/>
-              <a:t>)</a:t>
+              <a:t>(реализовано)</a:t>
             </a:r>
             <a:endParaRPr lang="ru-RU" sz="2800" dirty="0" smtClean="0"/>
           </a:p>
@@ -7683,11 +7781,7 @@
             </a:r>
             <a:r>
               <a:rPr lang="ru-RU" sz="2800" b="1" u="sng" dirty="0" smtClean="0"/>
-              <a:t>(реализовано</a:t>
-            </a:r>
-            <a:r>
-              <a:rPr lang="ru-RU" sz="2800" b="1" u="sng" dirty="0" smtClean="0"/>
-              <a:t>)</a:t>
+              <a:t>(реализовано)</a:t>
             </a:r>
             <a:endParaRPr lang="en-US" sz="2800" dirty="0" smtClean="0"/>
           </a:p>

</xml_diff>

<commit_message>
presentation and explanatory note are changed
</commit_message>
<xml_diff>
--- a/defence_of_project/presentation.pptx
+++ b/defence_of_project/presentation.pptx
@@ -5319,15 +5319,7 @@
           <a:p>
             <a:r>
               <a:rPr lang="ru-RU" i="1" dirty="0" smtClean="0"/>
-              <a:t>Создание </a:t>
-            </a:r>
-            <a:r>
-              <a:rPr lang="ru-RU" i="1" dirty="0" smtClean="0"/>
-              <a:t>подсистемы </a:t>
-            </a:r>
-            <a:r>
-              <a:rPr lang="ru-RU" i="1" dirty="0" smtClean="0"/>
-              <a:t>хранения результатов и статистики</a:t>
+              <a:t>Создание подсистемы хранения результатов и статистики</a:t>
             </a:r>
             <a:endParaRPr lang="ru-RU" i="1" dirty="0"/>
           </a:p>
@@ -5857,7 +5849,7 @@
           <p:cNvPr id="7" name="Рисунок 6">
             <a:extLst>
               <a:ext uri="{FF2B5EF4-FFF2-40B4-BE49-F238E27FC236}">
-                <a16:creationId xmlns="" xmlns:a16="http://schemas.microsoft.com/office/drawing/2014/main" xmlns:lc="http://schemas.openxmlformats.org/drawingml/2006/lockedCanvas" id="{404390DE-A7B3-4FEB-8EF6-5B3D5002D9C5}"/>
+                <a16:creationId xmlns:lc="http://schemas.openxmlformats.org/drawingml/2006/lockedCanvas" xmlns:a16="http://schemas.microsoft.com/office/drawing/2014/main" xmlns="" id="{404390DE-A7B3-4FEB-8EF6-5B3D5002D9C5}"/>
               </a:ext>
             </a:extLst>
           </p:cNvPr>
@@ -7497,7 +7489,7 @@
             </a:r>
             <a:r>
               <a:rPr lang="en-US" sz="2800" dirty="0" smtClean="0"/>
-              <a:t>&gt;500 </a:t>
+              <a:t>1114 </a:t>
             </a:r>
             <a:r>
               <a:rPr lang="ru-RU" sz="2800" dirty="0" smtClean="0"/>
@@ -7656,7 +7648,7 @@
             <a:pPr algn="l"/>
             <a:r>
               <a:rPr lang="ru-RU" dirty="0" smtClean="0"/>
-              <a:t>Выполнение критерий</a:t>
+              <a:t>Выполнение критериев</a:t>
             </a:r>
             <a:endParaRPr lang="ru-RU" dirty="0"/>
           </a:p>
@@ -7693,7 +7685,7 @@
               <a:t>requirements.txt </a:t>
             </a:r>
             <a:r>
-              <a:rPr lang="ru-RU" sz="2800" b="1" u="sng" dirty="0" smtClean="0"/>
+              <a:rPr lang="ru-RU" sz="2800" dirty="0" smtClean="0"/>
               <a:t>(реализовано)</a:t>
             </a:r>
             <a:endParaRPr lang="en-US" sz="2800" dirty="0" smtClean="0"/>
@@ -7712,10 +7704,9 @@
               <a:t> </a:t>
             </a:r>
             <a:r>
-              <a:rPr lang="ru-RU" sz="2800" b="1" u="sng" dirty="0" smtClean="0"/>
+              <a:rPr lang="ru-RU" sz="2800" dirty="0" smtClean="0"/>
               <a:t>(реализовано)</a:t>
             </a:r>
-            <a:endParaRPr lang="ru-RU" sz="2800" dirty="0" smtClean="0"/>
           </a:p>
           <a:p>
             <a:r>
@@ -7731,10 +7722,9 @@
               <a:t> </a:t>
             </a:r>
             <a:r>
-              <a:rPr lang="ru-RU" sz="2800" b="1" u="sng" dirty="0" smtClean="0"/>
+              <a:rPr lang="ru-RU" sz="2800" dirty="0" smtClean="0"/>
               <a:t>(реализовано)</a:t>
             </a:r>
-            <a:endParaRPr lang="ru-RU" sz="2800" dirty="0" smtClean="0"/>
           </a:p>
           <a:p>
             <a:r>
@@ -7750,25 +7740,19 @@
               <a:t> </a:t>
             </a:r>
             <a:r>
-              <a:rPr lang="ru-RU" sz="2800" b="1" u="sng" dirty="0" smtClean="0"/>
+              <a:rPr lang="ru-RU" sz="2800" dirty="0" smtClean="0"/>
               <a:t>(реализовано)</a:t>
             </a:r>
-            <a:endParaRPr lang="ru-RU" sz="2800" dirty="0" smtClean="0"/>
           </a:p>
           <a:p>
             <a:r>
               <a:rPr lang="en-US" sz="2800" dirty="0" smtClean="0"/>
-              <a:t>Collide</a:t>
-            </a:r>
-            <a:r>
-              <a:rPr lang="en-US" sz="2800" b="1" dirty="0" smtClean="0"/>
-              <a:t> </a:t>
-            </a:r>
-            <a:r>
-              <a:rPr lang="ru-RU" sz="2800" b="1" u="sng" dirty="0" smtClean="0"/>
+              <a:t>Collide </a:t>
+            </a:r>
+            <a:r>
+              <a:rPr lang="ru-RU" sz="2800" dirty="0" smtClean="0"/>
               <a:t>(реализовано)</a:t>
             </a:r>
-            <a:endParaRPr lang="ru-RU" sz="2800" dirty="0" smtClean="0"/>
           </a:p>
           <a:p>
             <a:r>
@@ -7776,11 +7760,11 @@
               <a:t>Анимация</a:t>
             </a:r>
             <a:r>
-              <a:rPr lang="en-US" sz="2800" b="1" dirty="0" smtClean="0"/>
+              <a:rPr lang="en-US" sz="2800" dirty="0" smtClean="0"/>
               <a:t> </a:t>
             </a:r>
             <a:r>
-              <a:rPr lang="ru-RU" sz="2800" b="1" u="sng" dirty="0" smtClean="0"/>
+              <a:rPr lang="ru-RU" sz="2800" dirty="0" smtClean="0"/>
               <a:t>(реализовано)</a:t>
             </a:r>
             <a:endParaRPr lang="en-US" sz="2800" dirty="0" smtClean="0"/>
@@ -7799,10 +7783,10 @@
               <a:t> </a:t>
             </a:r>
             <a:r>
-              <a:rPr lang="ru-RU" sz="2800" b="1" u="sng" dirty="0" smtClean="0"/>
+              <a:rPr lang="ru-RU" sz="2800" dirty="0" smtClean="0"/>
               <a:t>(реализовано)</a:t>
             </a:r>
-            <a:endParaRPr lang="en-US" sz="2800" b="1" u="sng" dirty="0" smtClean="0"/>
+            <a:endParaRPr lang="en-US" sz="2800" dirty="0" smtClean="0"/>
           </a:p>
           <a:p>
             <a:r>
@@ -7826,10 +7810,9 @@
               <a:t> </a:t>
             </a:r>
             <a:r>
-              <a:rPr lang="ru-RU" sz="2800" b="1" u="sng" dirty="0"/>
+              <a:rPr lang="ru-RU" sz="2800" dirty="0"/>
               <a:t>(реализовано)</a:t>
             </a:r>
-            <a:endParaRPr lang="ru-RU" sz="2800" dirty="0"/>
           </a:p>
         </p:txBody>
       </p:sp>

</xml_diff>

<commit_message>
link to video added
</commit_message>
<xml_diff>
--- a/defence_of_project/presentation.pptx
+++ b/defence_of_project/presentation.pptx
@@ -3249,8 +3249,41 @@
             </a:pPr>
             <a:r>
               <a:rPr lang="ru-RU" sz="2800" dirty="0" smtClean="0"/>
-              <a:t>Разработана программа согласно цели</a:t>
-            </a:r>
+              <a:t>Разработана программа согласно </a:t>
+            </a:r>
+            <a:r>
+              <a:rPr lang="ru-RU" sz="2800" dirty="0" smtClean="0"/>
+              <a:t>цели</a:t>
+            </a:r>
+            <a:endParaRPr lang="en-US" sz="2800" dirty="0" smtClean="0"/>
+          </a:p>
+          <a:p>
+            <a:pPr marL="0" indent="0">
+              <a:buNone/>
+            </a:pPr>
+            <a:endParaRPr lang="en-US" sz="2800" dirty="0"/>
+          </a:p>
+          <a:p>
+            <a:pPr marL="0" indent="0">
+              <a:buNone/>
+            </a:pPr>
+            <a:r>
+              <a:rPr lang="en-US" sz="2800" dirty="0">
+                <a:hlinkClick r:id="rId2"/>
+              </a:rPr>
+              <a:t>https://</a:t>
+            </a:r>
+            <a:r>
+              <a:rPr lang="en-US" sz="2800" dirty="0" smtClean="0">
+                <a:hlinkClick r:id="rId2"/>
+              </a:rPr>
+              <a:t>youtu.be/t3fQ0a8iYA8</a:t>
+            </a:r>
+            <a:r>
+              <a:rPr lang="en-US" sz="2800" dirty="0" smtClean="0"/>
+              <a:t> </a:t>
+            </a:r>
+            <a:endParaRPr lang="ru-RU" sz="2800" dirty="0" smtClean="0"/>
           </a:p>
         </p:txBody>
       </p:sp>
@@ -3263,7 +3296,7 @@
           <p:nvPr/>
         </p:nvPicPr>
         <p:blipFill>
-          <a:blip r:embed="rId2">
+          <a:blip r:embed="rId3">
             <a:extLst>
               <a:ext uri="{28A0092B-C50C-407E-A947-70E740481C1C}">
                 <a14:useLocalDpi xmlns:a14="http://schemas.microsoft.com/office/drawing/2010/main" val="0"/>
@@ -5849,7 +5882,7 @@
           <p:cNvPr id="7" name="Рисунок 6">
             <a:extLst>
               <a:ext uri="{FF2B5EF4-FFF2-40B4-BE49-F238E27FC236}">
-                <a16:creationId xmlns:lc="http://schemas.openxmlformats.org/drawingml/2006/lockedCanvas" xmlns:a16="http://schemas.microsoft.com/office/drawing/2014/main" xmlns="" id="{404390DE-A7B3-4FEB-8EF6-5B3D5002D9C5}"/>
+                <a16:creationId xmlns="" xmlns:a16="http://schemas.microsoft.com/office/drawing/2014/main" xmlns:lc="http://schemas.openxmlformats.org/drawingml/2006/lockedCanvas" id="{404390DE-A7B3-4FEB-8EF6-5B3D5002D9C5}"/>
               </a:ext>
             </a:extLst>
           </p:cNvPr>

</xml_diff>